<commit_message>
Fixed presentation and altered definitions
</commit_message>
<xml_diff>
--- a/Leertaken/Project/Presentation.pptx
+++ b/Leertaken/Project/Presentation.pptx
@@ -46202,8 +46202,8 @@
         </p:nvSpPr>
         <p:spPr>
           <a:xfrm>
-            <a:off x="227012" y="274638"/>
-            <a:ext cx="2359435" cy="1706562"/>
+            <a:off x="227013" y="274639"/>
+            <a:ext cx="1832678" cy="1325562"/>
           </a:xfrm>
           <a:prstGeom prst="rect">
             <a:avLst/>
@@ -46242,7 +46242,7 @@
           <a:lstStyle/>
           <a:p>
             <a:pPr algn="ctr"/>
-            <a:endParaRPr lang="en-US" sz="2400"/>
+            <a:endParaRPr lang="en-US" sz="2400" dirty="0"/>
           </a:p>
         </p:txBody>
       </p:sp>
@@ -46905,8 +46905,8 @@
         </p:nvSpPr>
         <p:spPr>
           <a:xfrm>
-            <a:off x="10514012" y="152400"/>
-            <a:ext cx="1828800" cy="1828800"/>
+            <a:off x="10590212" y="152400"/>
+            <a:ext cx="1752600" cy="1752600"/>
           </a:xfrm>
           <a:prstGeom prst="rect">
             <a:avLst/>
@@ -47235,7 +47235,7 @@
           <p:nvPr>
             <p:extLst>
               <p:ext uri="{D42A27DB-BD31-4B8C-83A1-F6EECF244321}">
-                <p14:modId xmlns:p14="http://schemas.microsoft.com/office/powerpoint/2010/main" val="2474216034"/>
+                <p14:modId xmlns:p14="http://schemas.microsoft.com/office/powerpoint/2010/main" val="1030691054"/>
               </p:ext>
             </p:extLst>
           </p:nvPr>
@@ -47879,7 +47879,7 @@
           <p:nvPr>
             <p:extLst>
               <p:ext uri="{D42A27DB-BD31-4B8C-83A1-F6EECF244321}">
-                <p14:modId xmlns:p14="http://schemas.microsoft.com/office/powerpoint/2010/main" val="2980822285"/>
+                <p14:modId xmlns:p14="http://schemas.microsoft.com/office/powerpoint/2010/main" val="1664943921"/>
               </p:ext>
             </p:extLst>
           </p:nvPr>
@@ -48553,14 +48553,14 @@
             <p:ph idx="1"/>
             <p:extLst>
               <p:ext uri="{D42A27DB-BD31-4B8C-83A1-F6EECF244321}">
-                <p14:modId xmlns:p14="http://schemas.microsoft.com/office/powerpoint/2010/main" val="1653088115"/>
+                <p14:modId xmlns:p14="http://schemas.microsoft.com/office/powerpoint/2010/main" val="4212292436"/>
               </p:ext>
             </p:extLst>
           </p:nvPr>
         </p:nvGraphicFramePr>
         <p:xfrm>
           <a:off x="1217613" y="2133600"/>
-          <a:ext cx="9753600" cy="4302760"/>
+          <a:ext cx="9753600" cy="2748280"/>
         </p:xfrm>
         <a:graphic>
           <a:graphicData uri="http://schemas.openxmlformats.org/drawingml/2006/table">
@@ -48590,6 +48590,7 @@
                     <a:bodyPr/>
                     <a:lstStyle/>
                     <a:p>
+                      <a:pPr algn="ctr"/>
                       <a:r>
                         <a:rPr lang="nl-NL" dirty="0" smtClean="0">
                           <a:solidFill>
@@ -48616,6 +48617,7 @@
                     <a:bodyPr/>
                     <a:lstStyle/>
                     <a:p>
+                      <a:pPr algn="ctr"/>
                       <a:r>
                         <a:rPr lang="nl-NL" dirty="0" smtClean="0">
                           <a:solidFill>
@@ -48644,6 +48646,7 @@
                     <a:bodyPr/>
                     <a:lstStyle/>
                     <a:p>
+                      <a:pPr algn="ctr"/>
                       <a:r>
                         <a:rPr lang="nl-NL" dirty="0" err="1" smtClean="0">
                           <a:solidFill>
@@ -48659,108 +48662,6 @@
                           <a:schemeClr val="accent4">
                             <a:lumMod val="75000"/>
                           </a:schemeClr>
-                        </a:solidFill>
-                      </a:endParaRPr>
-                    </a:p>
-                  </a:txBody>
-                  <a:tcPr/>
-                </a:tc>
-              </a:tr>
-              <a:tr h="370840">
-                <a:tc>
-                  <a:txBody>
-                    <a:bodyPr/>
-                    <a:lstStyle/>
-                    <a:p>
-                      <a:r>
-                        <a:rPr lang="nl-NL" dirty="0" smtClean="0"/>
-                        <a:t>Trial </a:t>
-                      </a:r>
-                      <a:r>
-                        <a:rPr lang="nl-NL" dirty="0" err="1" smtClean="0"/>
-                        <a:t>Period</a:t>
-                      </a:r>
-                      <a:r>
-                        <a:rPr lang="nl-NL" dirty="0" smtClean="0"/>
-                        <a:t> Hardware Evaluation</a:t>
-                      </a:r>
-                      <a:endParaRPr lang="en-US" dirty="0"/>
-                    </a:p>
-                  </a:txBody>
-                  <a:tcPr/>
-                </a:tc>
-                <a:tc>
-                  <a:txBody>
-                    <a:bodyPr/>
-                    <a:lstStyle/>
-                    <a:p>
-                      <a:r>
-                        <a:rPr lang="en-US" sz="2000" b="0" i="0" kern="1200" dirty="0" smtClean="0">
-                          <a:solidFill>
-                            <a:srgbClr val="00B050"/>
-                          </a:solidFill>
-                          <a:effectLst/>
-                          <a:latin typeface="+mn-lt"/>
-                          <a:ea typeface="+mn-ea"/>
-                          <a:cs typeface="+mn-cs"/>
-                        </a:rPr>
-                        <a:t>✓</a:t>
-                      </a:r>
-                      <a:endParaRPr lang="en-US" sz="2000" dirty="0">
-                        <a:solidFill>
-                          <a:srgbClr val="00B050"/>
-                        </a:solidFill>
-                      </a:endParaRPr>
-                    </a:p>
-                  </a:txBody>
-                  <a:tcPr/>
-                </a:tc>
-                <a:tc>
-                  <a:txBody>
-                    <a:bodyPr/>
-                    <a:lstStyle/>
-                    <a:p>
-                      <a:r>
-                        <a:rPr lang="en-US" sz="2000" b="0" i="0" kern="1200" dirty="0" smtClean="0">
-                          <a:solidFill>
-                            <a:srgbClr val="00B050"/>
-                          </a:solidFill>
-                          <a:effectLst/>
-                          <a:latin typeface="+mn-lt"/>
-                          <a:ea typeface="+mn-ea"/>
-                          <a:cs typeface="+mn-cs"/>
-                        </a:rPr>
-                        <a:t>✓</a:t>
-                      </a:r>
-                      <a:endParaRPr lang="en-US" sz="2000" dirty="0">
-                        <a:solidFill>
-                          <a:srgbClr val="00B050"/>
-                        </a:solidFill>
-                      </a:endParaRPr>
-                    </a:p>
-                  </a:txBody>
-                  <a:tcPr/>
-                </a:tc>
-                <a:tc>
-                  <a:txBody>
-                    <a:bodyPr/>
-                    <a:lstStyle/>
-                    <a:p>
-                      <a:r>
-                        <a:rPr lang="en-US" sz="2400" b="0" i="0" kern="1200" dirty="0" smtClean="0">
-                          <a:solidFill>
-                            <a:srgbClr val="FF0000"/>
-                          </a:solidFill>
-                          <a:effectLst/>
-                          <a:latin typeface="+mn-lt"/>
-                          <a:ea typeface="+mn-ea"/>
-                          <a:cs typeface="+mn-cs"/>
-                        </a:rPr>
-                        <a:t>×</a:t>
-                      </a:r>
-                      <a:endParaRPr lang="en-US" sz="2400" dirty="0">
-                        <a:solidFill>
-                          <a:srgbClr val="FF0000"/>
                         </a:solidFill>
                       </a:endParaRPr>
                     </a:p>
@@ -48939,112 +48840,6 @@
                       <a:endParaRPr lang="en-US" sz="2000" dirty="0">
                         <a:solidFill>
                           <a:srgbClr val="00B050"/>
-                        </a:solidFill>
-                      </a:endParaRPr>
-                    </a:p>
-                  </a:txBody>
-                  <a:tcPr/>
-                </a:tc>
-                <a:tc>
-                  <a:txBody>
-                    <a:bodyPr/>
-                    <a:lstStyle/>
-                    <a:p>
-                      <a:r>
-                        <a:rPr lang="en-US" sz="2400" b="0" i="0" kern="1200" dirty="0" smtClean="0">
-                          <a:solidFill>
-                            <a:srgbClr val="FF0000"/>
-                          </a:solidFill>
-                          <a:effectLst/>
-                          <a:latin typeface="+mn-lt"/>
-                          <a:ea typeface="+mn-ea"/>
-                          <a:cs typeface="+mn-cs"/>
-                        </a:rPr>
-                        <a:t>×</a:t>
-                      </a:r>
-                      <a:endParaRPr lang="en-US" sz="2400" dirty="0">
-                        <a:solidFill>
-                          <a:srgbClr val="FF0000"/>
-                        </a:solidFill>
-                      </a:endParaRPr>
-                    </a:p>
-                  </a:txBody>
-                  <a:tcPr/>
-                </a:tc>
-              </a:tr>
-              <a:tr h="370840">
-                <a:tc>
-                  <a:txBody>
-                    <a:bodyPr/>
-                    <a:lstStyle/>
-                    <a:p>
-                      <a:r>
-                        <a:rPr lang="nl-NL" dirty="0" err="1" smtClean="0"/>
-                        <a:t>DDoS</a:t>
-                      </a:r>
-                      <a:r>
-                        <a:rPr lang="nl-NL" dirty="0" smtClean="0"/>
-                        <a:t> </a:t>
-                      </a:r>
-                      <a:r>
-                        <a:rPr lang="nl-NL" dirty="0" err="1" smtClean="0"/>
-                        <a:t>Intervention</a:t>
-                      </a:r>
-                      <a:r>
-                        <a:rPr lang="nl-NL" dirty="0" smtClean="0"/>
-                        <a:t> plan</a:t>
-                      </a:r>
-                      <a:endParaRPr lang="en-US" dirty="0"/>
-                    </a:p>
-                  </a:txBody>
-                  <a:tcPr/>
-                </a:tc>
-                <a:tc>
-                  <a:txBody>
-                    <a:bodyPr/>
-                    <a:lstStyle/>
-                    <a:p>
-                      <a:r>
-                        <a:rPr lang="en-US" sz="2000" b="0" i="0" kern="1200" dirty="0" smtClean="0">
-                          <a:solidFill>
-                            <a:srgbClr val="00B050"/>
-                          </a:solidFill>
-                          <a:effectLst/>
-                          <a:latin typeface="+mn-lt"/>
-                          <a:ea typeface="+mn-ea"/>
-                          <a:cs typeface="+mn-cs"/>
-                        </a:rPr>
-                        <a:t>✓</a:t>
-                      </a:r>
-                      <a:endParaRPr lang="en-US" sz="2000" dirty="0">
-                        <a:solidFill>
-                          <a:srgbClr val="00B050"/>
-                        </a:solidFill>
-                      </a:endParaRPr>
-                    </a:p>
-                  </a:txBody>
-                  <a:tcPr/>
-                </a:tc>
-                <a:tc>
-                  <a:txBody>
-                    <a:bodyPr/>
-                    <a:lstStyle/>
-                    <a:p>
-                      <a:r>
-                        <a:rPr lang="en-US" sz="2400" b="0" i="0" kern="1200" dirty="0" smtClean="0">
-                          <a:solidFill>
-                            <a:srgbClr val="FF0000"/>
-                          </a:solidFill>
-                          <a:effectLst/>
-                          <a:latin typeface="+mn-lt"/>
-                          <a:ea typeface="+mn-ea"/>
-                          <a:cs typeface="+mn-cs"/>
-                        </a:rPr>
-                        <a:t>×</a:t>
-                      </a:r>
-                      <a:endParaRPr lang="en-US" sz="2400" dirty="0">
-                        <a:solidFill>
-                          <a:srgbClr val="FF0000"/>
                         </a:solidFill>
                       </a:endParaRPr>
                     </a:p>
@@ -49465,14 +49260,14 @@
           <p:nvPr>
             <p:extLst>
               <p:ext uri="{D42A27DB-BD31-4B8C-83A1-F6EECF244321}">
-                <p14:modId xmlns:p14="http://schemas.microsoft.com/office/powerpoint/2010/main" val="931825442"/>
+                <p14:modId xmlns:p14="http://schemas.microsoft.com/office/powerpoint/2010/main" val="2698377630"/>
               </p:ext>
             </p:extLst>
           </p:nvPr>
         </p:nvGraphicFramePr>
         <p:xfrm>
-          <a:off x="379412" y="3810000"/>
-          <a:ext cx="6094413" cy="2026920"/>
+          <a:off x="379412" y="3733800"/>
+          <a:ext cx="2031471" cy="1483360"/>
         </p:xfrm>
         <a:graphic>
           <a:graphicData uri="http://schemas.openxmlformats.org/drawingml/2006/table">
@@ -49481,8 +49276,6 @@
                 <a:tableStyleId>{073A0DAA-6AF3-43AB-8588-CEC1D06C72B9}</a:tableStyleId>
               </a:tblPr>
               <a:tblGrid>
-                <a:gridCol w="2031471"/>
-                <a:gridCol w="2031471"/>
                 <a:gridCol w="2031471"/>
               </a:tblGrid>
               <a:tr h="370840">
@@ -49551,203 +49344,6 @@
                     </a:lnBlToTr>
                   </a:tcPr>
                 </a:tc>
-                <a:tc>
-                  <a:txBody>
-                    <a:bodyPr/>
-                    <a:lstStyle/>
-                    <a:p>
-                      <a:pPr marL="0" marR="0" indent="0" algn="l" defTabSz="914400" rtl="0" eaLnBrk="1" fontAlgn="auto" latinLnBrk="0" hangingPunct="1">
-                        <a:lnSpc>
-                          <a:spcPct val="100000"/>
-                        </a:lnSpc>
-                        <a:spcBef>
-                          <a:spcPts val="0"/>
-                        </a:spcBef>
-                        <a:spcAft>
-                          <a:spcPts val="0"/>
-                        </a:spcAft>
-                        <a:buClrTx/>
-                        <a:buSzTx/>
-                        <a:buFontTx/>
-                        <a:buNone/>
-                        <a:tabLst/>
-                        <a:defRPr/>
-                      </a:pPr>
-                      <a:r>
-                        <a:rPr lang="nl-NL" dirty="0" smtClean="0"/>
-                        <a:t>Max </a:t>
-                      </a:r>
-                      <a:r>
-                        <a:rPr lang="nl-NL" dirty="0" err="1" smtClean="0"/>
-                        <a:t>amount</a:t>
-                      </a:r>
-                      <a:r>
-                        <a:rPr lang="nl-NL" dirty="0" smtClean="0"/>
-                        <a:t> of </a:t>
-                      </a:r>
-                      <a:r>
-                        <a:rPr lang="nl-NL" dirty="0" err="1" smtClean="0"/>
-                        <a:t>incidents</a:t>
-                      </a:r>
-                      <a:r>
-                        <a:rPr lang="nl-NL" baseline="0" dirty="0" smtClean="0"/>
-                        <a:t> </a:t>
-                      </a:r>
-                      <a:r>
-                        <a:rPr lang="nl-NL" baseline="0" dirty="0" err="1" smtClean="0"/>
-                        <a:t>exceeding</a:t>
-                      </a:r>
-                      <a:r>
-                        <a:rPr lang="nl-NL" baseline="0" dirty="0" smtClean="0"/>
-                        <a:t> IRT</a:t>
-                      </a:r>
-                      <a:endParaRPr lang="en-US" dirty="0" smtClean="0"/>
-                    </a:p>
-                  </a:txBody>
-                  <a:tcPr>
-                    <a:lnL w="12700" cap="flat" cmpd="sng" algn="ctr">
-                      <a:solidFill>
-                        <a:schemeClr val="tx1"/>
-                      </a:solidFill>
-                      <a:prstDash val="solid"/>
-                      <a:round/>
-                      <a:headEnd type="none" w="med" len="med"/>
-                      <a:tailEnd type="none" w="med" len="med"/>
-                    </a:lnL>
-                    <a:lnR w="12700" cap="flat" cmpd="sng" algn="ctr">
-                      <a:solidFill>
-                        <a:schemeClr val="tx1"/>
-                      </a:solidFill>
-                      <a:prstDash val="solid"/>
-                      <a:round/>
-                      <a:headEnd type="none" w="med" len="med"/>
-                      <a:tailEnd type="none" w="med" len="med"/>
-                    </a:lnR>
-                    <a:lnT w="12700" cap="flat" cmpd="sng" algn="ctr">
-                      <a:solidFill>
-                        <a:schemeClr val="tx1"/>
-                      </a:solidFill>
-                      <a:prstDash val="solid"/>
-                      <a:round/>
-                      <a:headEnd type="none" w="med" len="med"/>
-                      <a:tailEnd type="none" w="med" len="med"/>
-                    </a:lnT>
-                    <a:lnB w="12700" cap="flat" cmpd="sng" algn="ctr">
-                      <a:solidFill>
-                        <a:schemeClr val="tx1"/>
-                      </a:solidFill>
-                      <a:prstDash val="solid"/>
-                      <a:round/>
-                      <a:headEnd type="none" w="med" len="med"/>
-                      <a:tailEnd type="none" w="med" len="med"/>
-                    </a:lnB>
-                    <a:lnTlToBr w="12700" cmpd="sng">
-                      <a:noFill/>
-                      <a:prstDash val="solid"/>
-                    </a:lnTlToBr>
-                    <a:lnBlToTr w="12700" cmpd="sng">
-                      <a:noFill/>
-                      <a:prstDash val="solid"/>
-                    </a:lnBlToTr>
-                  </a:tcPr>
-                </a:tc>
-                <a:tc>
-                  <a:txBody>
-                    <a:bodyPr/>
-                    <a:lstStyle/>
-                    <a:p>
-                      <a:pPr marL="0" marR="0" indent="0" algn="l" defTabSz="914400" rtl="0" eaLnBrk="1" fontAlgn="auto" latinLnBrk="0" hangingPunct="1">
-                        <a:lnSpc>
-                          <a:spcPct val="100000"/>
-                        </a:lnSpc>
-                        <a:spcBef>
-                          <a:spcPts val="0"/>
-                        </a:spcBef>
-                        <a:spcAft>
-                          <a:spcPts val="0"/>
-                        </a:spcAft>
-                        <a:buClrTx/>
-                        <a:buSzTx/>
-                        <a:buFontTx/>
-                        <a:buNone/>
-                        <a:tabLst/>
-                        <a:defRPr/>
-                      </a:pPr>
-                      <a:r>
-                        <a:rPr lang="nl-NL" dirty="0" smtClean="0"/>
-                        <a:t>Max </a:t>
-                      </a:r>
-                      <a:r>
-                        <a:rPr lang="nl-NL" dirty="0" err="1" smtClean="0"/>
-                        <a:t>amount</a:t>
-                      </a:r>
-                      <a:r>
-                        <a:rPr lang="nl-NL" baseline="0" dirty="0" smtClean="0"/>
-                        <a:t> of </a:t>
-                      </a:r>
-                      <a:r>
-                        <a:rPr lang="nl-NL" baseline="0" dirty="0" err="1" smtClean="0"/>
-                        <a:t>complaints</a:t>
-                      </a:r>
-                      <a:endParaRPr lang="en-US" dirty="0" smtClean="0"/>
-                    </a:p>
-                    <a:p>
-                      <a:endParaRPr lang="en-US" dirty="0">
-                        <a:solidFill>
-                          <a:schemeClr val="accent4">
-                            <a:lumMod val="50000"/>
-                          </a:schemeClr>
-                        </a:solidFill>
-                      </a:endParaRPr>
-                    </a:p>
-                  </a:txBody>
-                  <a:tcPr>
-                    <a:lnL w="12700" cap="flat" cmpd="sng" algn="ctr">
-                      <a:solidFill>
-                        <a:schemeClr val="tx1"/>
-                      </a:solidFill>
-                      <a:prstDash val="solid"/>
-                      <a:round/>
-                      <a:headEnd type="none" w="med" len="med"/>
-                      <a:tailEnd type="none" w="med" len="med"/>
-                    </a:lnL>
-                    <a:lnR w="12700" cap="flat" cmpd="sng" algn="ctr">
-                      <a:solidFill>
-                        <a:schemeClr val="tx1"/>
-                      </a:solidFill>
-                      <a:prstDash val="solid"/>
-                      <a:round/>
-                      <a:headEnd type="none" w="med" len="med"/>
-                      <a:tailEnd type="none" w="med" len="med"/>
-                    </a:lnR>
-                    <a:lnT w="12700" cap="flat" cmpd="sng" algn="ctr">
-                      <a:solidFill>
-                        <a:schemeClr val="tx1"/>
-                      </a:solidFill>
-                      <a:prstDash val="solid"/>
-                      <a:round/>
-                      <a:headEnd type="none" w="med" len="med"/>
-                      <a:tailEnd type="none" w="med" len="med"/>
-                    </a:lnT>
-                    <a:lnB w="12700" cap="flat" cmpd="sng" algn="ctr">
-                      <a:solidFill>
-                        <a:schemeClr val="tx1"/>
-                      </a:solidFill>
-                      <a:prstDash val="solid"/>
-                      <a:round/>
-                      <a:headEnd type="none" w="med" len="med"/>
-                      <a:tailEnd type="none" w="med" len="med"/>
-                    </a:lnB>
-                    <a:lnTlToBr w="12700" cmpd="sng">
-                      <a:noFill/>
-                      <a:prstDash val="solid"/>
-                    </a:lnTlToBr>
-                    <a:lnBlToTr w="12700" cmpd="sng">
-                      <a:noFill/>
-                      <a:prstDash val="solid"/>
-                    </a:lnBlToTr>
-                  </a:tcPr>
-                </a:tc>
               </a:tr>
               <a:tr h="370840">
                 <a:tc>
@@ -49764,148 +49360,6 @@
                           </a:solidFill>
                         </a:rPr>
                         <a:t>99%</a:t>
-                      </a:r>
-                      <a:endParaRPr lang="en-US" dirty="0">
-                        <a:solidFill>
-                          <a:schemeClr val="accent2">
-                            <a:lumMod val="75000"/>
-                          </a:schemeClr>
-                        </a:solidFill>
-                      </a:endParaRPr>
-                    </a:p>
-                  </a:txBody>
-                  <a:tcPr>
-                    <a:lnL w="12700" cap="flat" cmpd="sng" algn="ctr">
-                      <a:solidFill>
-                        <a:schemeClr val="tx1"/>
-                      </a:solidFill>
-                      <a:prstDash val="solid"/>
-                      <a:round/>
-                      <a:headEnd type="none" w="med" len="med"/>
-                      <a:tailEnd type="none" w="med" len="med"/>
-                    </a:lnL>
-                    <a:lnR w="12700" cap="flat" cmpd="sng" algn="ctr">
-                      <a:solidFill>
-                        <a:schemeClr val="tx1"/>
-                      </a:solidFill>
-                      <a:prstDash val="solid"/>
-                      <a:round/>
-                      <a:headEnd type="none" w="med" len="med"/>
-                      <a:tailEnd type="none" w="med" len="med"/>
-                    </a:lnR>
-                    <a:lnT w="12700" cap="flat" cmpd="sng" algn="ctr">
-                      <a:solidFill>
-                        <a:schemeClr val="tx1"/>
-                      </a:solidFill>
-                      <a:prstDash val="solid"/>
-                      <a:round/>
-                      <a:headEnd type="none" w="med" len="med"/>
-                      <a:tailEnd type="none" w="med" len="med"/>
-                    </a:lnT>
-                    <a:lnB w="12700" cap="flat" cmpd="sng" algn="ctr">
-                      <a:solidFill>
-                        <a:schemeClr val="tx1"/>
-                      </a:solidFill>
-                      <a:prstDash val="solid"/>
-                      <a:round/>
-                      <a:headEnd type="none" w="med" len="med"/>
-                      <a:tailEnd type="none" w="med" len="med"/>
-                    </a:lnB>
-                    <a:lnTlToBr w="12700" cmpd="sng">
-                      <a:noFill/>
-                      <a:prstDash val="solid"/>
-                    </a:lnTlToBr>
-                    <a:lnBlToTr w="12700" cmpd="sng">
-                      <a:noFill/>
-                      <a:prstDash val="solid"/>
-                    </a:lnBlToTr>
-                  </a:tcPr>
-                </a:tc>
-                <a:tc>
-                  <a:txBody>
-                    <a:bodyPr/>
-                    <a:lstStyle/>
-                    <a:p>
-                      <a:r>
-                        <a:rPr lang="nl-NL" dirty="0" smtClean="0">
-                          <a:solidFill>
-                            <a:schemeClr val="accent2">
-                              <a:lumMod val="75000"/>
-                            </a:schemeClr>
-                          </a:solidFill>
-                        </a:rPr>
-                        <a:t>10</a:t>
-                      </a:r>
-                      <a:endParaRPr lang="en-US" dirty="0">
-                        <a:solidFill>
-                          <a:schemeClr val="accent2">
-                            <a:lumMod val="75000"/>
-                          </a:schemeClr>
-                        </a:solidFill>
-                      </a:endParaRPr>
-                    </a:p>
-                  </a:txBody>
-                  <a:tcPr>
-                    <a:lnL w="12700" cap="flat" cmpd="sng" algn="ctr">
-                      <a:solidFill>
-                        <a:schemeClr val="tx1"/>
-                      </a:solidFill>
-                      <a:prstDash val="solid"/>
-                      <a:round/>
-                      <a:headEnd type="none" w="med" len="med"/>
-                      <a:tailEnd type="none" w="med" len="med"/>
-                    </a:lnL>
-                    <a:lnR w="12700" cap="flat" cmpd="sng" algn="ctr">
-                      <a:solidFill>
-                        <a:schemeClr val="tx1"/>
-                      </a:solidFill>
-                      <a:prstDash val="solid"/>
-                      <a:round/>
-                      <a:headEnd type="none" w="med" len="med"/>
-                      <a:tailEnd type="none" w="med" len="med"/>
-                    </a:lnR>
-                    <a:lnT w="12700" cap="flat" cmpd="sng" algn="ctr">
-                      <a:solidFill>
-                        <a:schemeClr val="tx1"/>
-                      </a:solidFill>
-                      <a:prstDash val="solid"/>
-                      <a:round/>
-                      <a:headEnd type="none" w="med" len="med"/>
-                      <a:tailEnd type="none" w="med" len="med"/>
-                    </a:lnT>
-                    <a:lnB w="12700" cap="flat" cmpd="sng" algn="ctr">
-                      <a:solidFill>
-                        <a:schemeClr val="tx1"/>
-                      </a:solidFill>
-                      <a:prstDash val="solid"/>
-                      <a:round/>
-                      <a:headEnd type="none" w="med" len="med"/>
-                      <a:tailEnd type="none" w="med" len="med"/>
-                    </a:lnB>
-                    <a:lnTlToBr w="12700" cmpd="sng">
-                      <a:noFill/>
-                      <a:prstDash val="solid"/>
-                    </a:lnTlToBr>
-                    <a:lnBlToTr w="12700" cmpd="sng">
-                      <a:noFill/>
-                      <a:prstDash val="solid"/>
-                    </a:lnBlToTr>
-                  </a:tcPr>
-                </a:tc>
-                <a:tc>
-                  <a:txBody>
-                    <a:bodyPr/>
-                    <a:lstStyle/>
-                    <a:p>
-                      <a:r>
-                        <a:rPr lang="nl-NL" dirty="0" smtClean="0">
-                          <a:solidFill>
-                            <a:schemeClr val="accent2">
-                              <a:lumMod val="75000"/>
-                            </a:schemeClr>
-                          </a:solidFill>
-                        </a:rPr>
-                        <a:t>5</a:t>
                       </a:r>
                       <a:endParaRPr lang="en-US" dirty="0">
                         <a:solidFill>
@@ -50053,148 +49507,6 @@
                     </a:lnBlToTr>
                   </a:tcPr>
                 </a:tc>
-                <a:tc>
-                  <a:txBody>
-                    <a:bodyPr/>
-                    <a:lstStyle/>
-                    <a:p>
-                      <a:r>
-                        <a:rPr lang="nl-NL" dirty="0" smtClean="0">
-                          <a:solidFill>
-                            <a:schemeClr val="bg2">
-                              <a:lumMod val="75000"/>
-                            </a:schemeClr>
-                          </a:solidFill>
-                        </a:rPr>
-                        <a:t>8</a:t>
-                      </a:r>
-                      <a:endParaRPr lang="en-US" dirty="0">
-                        <a:solidFill>
-                          <a:schemeClr val="bg2">
-                            <a:lumMod val="75000"/>
-                          </a:schemeClr>
-                        </a:solidFill>
-                      </a:endParaRPr>
-                    </a:p>
-                  </a:txBody>
-                  <a:tcPr>
-                    <a:lnL w="12700" cap="flat" cmpd="sng" algn="ctr">
-                      <a:solidFill>
-                        <a:schemeClr val="tx1"/>
-                      </a:solidFill>
-                      <a:prstDash val="solid"/>
-                      <a:round/>
-                      <a:headEnd type="none" w="med" len="med"/>
-                      <a:tailEnd type="none" w="med" len="med"/>
-                    </a:lnL>
-                    <a:lnR w="12700" cap="flat" cmpd="sng" algn="ctr">
-                      <a:solidFill>
-                        <a:schemeClr val="tx1"/>
-                      </a:solidFill>
-                      <a:prstDash val="solid"/>
-                      <a:round/>
-                      <a:headEnd type="none" w="med" len="med"/>
-                      <a:tailEnd type="none" w="med" len="med"/>
-                    </a:lnR>
-                    <a:lnT w="12700" cap="flat" cmpd="sng" algn="ctr">
-                      <a:solidFill>
-                        <a:schemeClr val="tx1"/>
-                      </a:solidFill>
-                      <a:prstDash val="solid"/>
-                      <a:round/>
-                      <a:headEnd type="none" w="med" len="med"/>
-                      <a:tailEnd type="none" w="med" len="med"/>
-                    </a:lnT>
-                    <a:lnB w="12700" cap="flat" cmpd="sng" algn="ctr">
-                      <a:solidFill>
-                        <a:schemeClr val="tx1"/>
-                      </a:solidFill>
-                      <a:prstDash val="solid"/>
-                      <a:round/>
-                      <a:headEnd type="none" w="med" len="med"/>
-                      <a:tailEnd type="none" w="med" len="med"/>
-                    </a:lnB>
-                    <a:lnTlToBr w="12700" cmpd="sng">
-                      <a:noFill/>
-                      <a:prstDash val="solid"/>
-                    </a:lnTlToBr>
-                    <a:lnBlToTr w="12700" cmpd="sng">
-                      <a:noFill/>
-                      <a:prstDash val="solid"/>
-                    </a:lnBlToTr>
-                  </a:tcPr>
-                </a:tc>
-                <a:tc>
-                  <a:txBody>
-                    <a:bodyPr/>
-                    <a:lstStyle/>
-                    <a:p>
-                      <a:r>
-                        <a:rPr lang="nl-NL" dirty="0" smtClean="0">
-                          <a:solidFill>
-                            <a:schemeClr val="bg2">
-                              <a:lumMod val="75000"/>
-                            </a:schemeClr>
-                          </a:solidFill>
-                        </a:rPr>
-                        <a:t>3</a:t>
-                      </a:r>
-                      <a:endParaRPr lang="en-US" dirty="0">
-                        <a:solidFill>
-                          <a:schemeClr val="bg2">
-                            <a:lumMod val="75000"/>
-                          </a:schemeClr>
-                        </a:solidFill>
-                      </a:endParaRPr>
-                    </a:p>
-                  </a:txBody>
-                  <a:tcPr>
-                    <a:lnL w="12700" cap="flat" cmpd="sng" algn="ctr">
-                      <a:solidFill>
-                        <a:schemeClr val="tx1"/>
-                      </a:solidFill>
-                      <a:prstDash val="solid"/>
-                      <a:round/>
-                      <a:headEnd type="none" w="med" len="med"/>
-                      <a:tailEnd type="none" w="med" len="med"/>
-                    </a:lnL>
-                    <a:lnR w="12700" cap="flat" cmpd="sng" algn="ctr">
-                      <a:solidFill>
-                        <a:schemeClr val="tx1"/>
-                      </a:solidFill>
-                      <a:prstDash val="solid"/>
-                      <a:round/>
-                      <a:headEnd type="none" w="med" len="med"/>
-                      <a:tailEnd type="none" w="med" len="med"/>
-                    </a:lnR>
-                    <a:lnT w="12700" cap="flat" cmpd="sng" algn="ctr">
-                      <a:solidFill>
-                        <a:schemeClr val="tx1"/>
-                      </a:solidFill>
-                      <a:prstDash val="solid"/>
-                      <a:round/>
-                      <a:headEnd type="none" w="med" len="med"/>
-                      <a:tailEnd type="none" w="med" len="med"/>
-                    </a:lnT>
-                    <a:lnB w="12700" cap="flat" cmpd="sng" algn="ctr">
-                      <a:solidFill>
-                        <a:schemeClr val="tx1"/>
-                      </a:solidFill>
-                      <a:prstDash val="solid"/>
-                      <a:round/>
-                      <a:headEnd type="none" w="med" len="med"/>
-                      <a:tailEnd type="none" w="med" len="med"/>
-                    </a:lnB>
-                    <a:lnTlToBr w="12700" cmpd="sng">
-                      <a:noFill/>
-                      <a:prstDash val="solid"/>
-                    </a:lnTlToBr>
-                    <a:lnBlToTr w="12700" cmpd="sng">
-                      <a:noFill/>
-                      <a:prstDash val="solid"/>
-                    </a:lnBlToTr>
-                  </a:tcPr>
-                </a:tc>
               </a:tr>
               <a:tr h="370840">
                 <a:tc>
@@ -50230,148 +49542,6 @@
                         <a:t>95%</a:t>
                       </a:r>
                       <a:endParaRPr lang="en-US" dirty="0" smtClean="0">
-                        <a:solidFill>
-                          <a:schemeClr val="accent4">
-                            <a:lumMod val="50000"/>
-                          </a:schemeClr>
-                        </a:solidFill>
-                      </a:endParaRPr>
-                    </a:p>
-                  </a:txBody>
-                  <a:tcPr>
-                    <a:lnL w="12700" cap="flat" cmpd="sng" algn="ctr">
-                      <a:solidFill>
-                        <a:schemeClr val="tx1"/>
-                      </a:solidFill>
-                      <a:prstDash val="solid"/>
-                      <a:round/>
-                      <a:headEnd type="none" w="med" len="med"/>
-                      <a:tailEnd type="none" w="med" len="med"/>
-                    </a:lnL>
-                    <a:lnR w="12700" cap="flat" cmpd="sng" algn="ctr">
-                      <a:solidFill>
-                        <a:schemeClr val="tx1"/>
-                      </a:solidFill>
-                      <a:prstDash val="solid"/>
-                      <a:round/>
-                      <a:headEnd type="none" w="med" len="med"/>
-                      <a:tailEnd type="none" w="med" len="med"/>
-                    </a:lnR>
-                    <a:lnT w="12700" cap="flat" cmpd="sng" algn="ctr">
-                      <a:solidFill>
-                        <a:schemeClr val="tx1"/>
-                      </a:solidFill>
-                      <a:prstDash val="solid"/>
-                      <a:round/>
-                      <a:headEnd type="none" w="med" len="med"/>
-                      <a:tailEnd type="none" w="med" len="med"/>
-                    </a:lnT>
-                    <a:lnB w="12700" cap="flat" cmpd="sng" algn="ctr">
-                      <a:solidFill>
-                        <a:schemeClr val="tx1"/>
-                      </a:solidFill>
-                      <a:prstDash val="solid"/>
-                      <a:round/>
-                      <a:headEnd type="none" w="med" len="med"/>
-                      <a:tailEnd type="none" w="med" len="med"/>
-                    </a:lnB>
-                    <a:lnTlToBr w="12700" cmpd="sng">
-                      <a:noFill/>
-                      <a:prstDash val="solid"/>
-                    </a:lnTlToBr>
-                    <a:lnBlToTr w="12700" cmpd="sng">
-                      <a:noFill/>
-                      <a:prstDash val="solid"/>
-                    </a:lnBlToTr>
-                  </a:tcPr>
-                </a:tc>
-                <a:tc>
-                  <a:txBody>
-                    <a:bodyPr/>
-                    <a:lstStyle/>
-                    <a:p>
-                      <a:r>
-                        <a:rPr lang="nl-NL" dirty="0" smtClean="0">
-                          <a:solidFill>
-                            <a:schemeClr val="accent4">
-                              <a:lumMod val="50000"/>
-                            </a:schemeClr>
-                          </a:solidFill>
-                        </a:rPr>
-                        <a:t>5</a:t>
-                      </a:r>
-                      <a:endParaRPr lang="en-US" dirty="0">
-                        <a:solidFill>
-                          <a:schemeClr val="accent4">
-                            <a:lumMod val="50000"/>
-                          </a:schemeClr>
-                        </a:solidFill>
-                      </a:endParaRPr>
-                    </a:p>
-                  </a:txBody>
-                  <a:tcPr>
-                    <a:lnL w="12700" cap="flat" cmpd="sng" algn="ctr">
-                      <a:solidFill>
-                        <a:schemeClr val="tx1"/>
-                      </a:solidFill>
-                      <a:prstDash val="solid"/>
-                      <a:round/>
-                      <a:headEnd type="none" w="med" len="med"/>
-                      <a:tailEnd type="none" w="med" len="med"/>
-                    </a:lnL>
-                    <a:lnR w="12700" cap="flat" cmpd="sng" algn="ctr">
-                      <a:solidFill>
-                        <a:schemeClr val="tx1"/>
-                      </a:solidFill>
-                      <a:prstDash val="solid"/>
-                      <a:round/>
-                      <a:headEnd type="none" w="med" len="med"/>
-                      <a:tailEnd type="none" w="med" len="med"/>
-                    </a:lnR>
-                    <a:lnT w="12700" cap="flat" cmpd="sng" algn="ctr">
-                      <a:solidFill>
-                        <a:schemeClr val="tx1"/>
-                      </a:solidFill>
-                      <a:prstDash val="solid"/>
-                      <a:round/>
-                      <a:headEnd type="none" w="med" len="med"/>
-                      <a:tailEnd type="none" w="med" len="med"/>
-                    </a:lnT>
-                    <a:lnB w="12700" cap="flat" cmpd="sng" algn="ctr">
-                      <a:solidFill>
-                        <a:schemeClr val="tx1"/>
-                      </a:solidFill>
-                      <a:prstDash val="solid"/>
-                      <a:round/>
-                      <a:headEnd type="none" w="med" len="med"/>
-                      <a:tailEnd type="none" w="med" len="med"/>
-                    </a:lnB>
-                    <a:lnTlToBr w="12700" cmpd="sng">
-                      <a:noFill/>
-                      <a:prstDash val="solid"/>
-                    </a:lnTlToBr>
-                    <a:lnBlToTr w="12700" cmpd="sng">
-                      <a:noFill/>
-                      <a:prstDash val="solid"/>
-                    </a:lnBlToTr>
-                  </a:tcPr>
-                </a:tc>
-                <a:tc>
-                  <a:txBody>
-                    <a:bodyPr/>
-                    <a:lstStyle/>
-                    <a:p>
-                      <a:r>
-                        <a:rPr lang="nl-NL" dirty="0" smtClean="0">
-                          <a:solidFill>
-                            <a:schemeClr val="accent4">
-                              <a:lumMod val="50000"/>
-                            </a:schemeClr>
-                          </a:solidFill>
-                        </a:rPr>
-                        <a:t>0</a:t>
-                      </a:r>
-                      <a:endParaRPr lang="en-US" dirty="0">
                         <a:solidFill>
                           <a:schemeClr val="accent4">
                             <a:lumMod val="50000"/>

</xml_diff>